<commit_message>
2. kur 6 gün
</commit_message>
<xml_diff>
--- a/Kur 2/6. gün/Html.pptx
+++ b/Kur 2/6. gün/Html.pptx
@@ -6883,7 +6883,16 @@
             </a:pPr>
             <a:r>
               <a:rPr lang="tr-TR" dirty="0"/>
-              <a:t>&lt;etiket özellik=‘Değer’&gt;İçerik&lt;/etiket&gt;</a:t>
+              <a:t>&lt;etiket özellik=‘Değer’&gt; İçerik &lt;/etiket&gt;</a:t>
+            </a:r>
+          </a:p>
+          <a:p>
+            <a:pPr marL="0" indent="0">
+              <a:buNone/>
+            </a:pPr>
+            <a:r>
+              <a:rPr lang="tr-TR" dirty="0"/>
+              <a:t>&lt;etiket özellik=‘Değer’ /&gt;</a:t>
             </a:r>
           </a:p>
         </p:txBody>
@@ -7644,7 +7653,7 @@
           <a:p>
             <a:r>
               <a:rPr lang="tr-TR" dirty="0" err="1"/>
-              <a:t>Notpadd</a:t>
+              <a:t>Notpad</a:t>
             </a:r>
             <a:r>
               <a:rPr lang="tr-TR" dirty="0"/>
@@ -7732,7 +7741,10 @@
           <a:bodyPr/>
           <a:lstStyle/>
           <a:p>
-            <a:endParaRPr lang="tr-TR" dirty="0"/>
+            <a:r>
+              <a:rPr lang="tr-TR" dirty="0"/>
+              <a:t>Html Standart Etiketler</a:t>
+            </a:r>
           </a:p>
         </p:txBody>
       </p:sp>
@@ -8142,15 +8154,7 @@
           <a:p>
             <a:r>
               <a:rPr lang="tr-TR" dirty="0"/>
-              <a:t>&lt;p</a:t>
-            </a:r>
-            <a:r>
-              <a:rPr lang="tr-TR"/>
-              <a:t>&gt; paragraf </a:t>
-            </a:r>
-            <a:r>
-              <a:rPr lang="tr-TR" dirty="0"/>
-              <a:t>tanımlar</a:t>
+              <a:t>&lt;p&gt; paragraf tanımlar</a:t>
             </a:r>
           </a:p>
           <a:p>

</xml_diff>